<commit_message>
changes on my part
</commit_message>
<xml_diff>
--- a/ppt/premature ppt.pptx
+++ b/ppt/premature ppt.pptx
@@ -137,7 +137,7 @@
   </p:defaultTextStyle>
   <p:extLst>
     <p:ext uri="{EFAFB233-063F-42B5-8137-9DF3F51BA10A}">
-      <p15:sldGuideLst xmlns:p15="http://schemas.microsoft.com/office/powerpoint/2012/main">
+      <p15:sldGuideLst xmlns:p15="http://schemas.microsoft.com/office/powerpoint/2012/main" xmlns="">
         <p15:guide id="1" orient="horz" pos="2160">
           <p15:clr>
             <a:srgbClr val="A4A3A4"/>
@@ -395,7 +395,7 @@
           <a:p>
             <a:fld id="{A5874EA0-E96F-4A9F-BECE-F82ED93FDC31}" type="slidenum">
               <a:rPr lang="da-DK" smtClean="0"/>
-              <a:t>‹nr.›</a:t>
+              <a:t>‹#›</a:t>
             </a:fld>
             <a:endParaRPr lang="da-DK"/>
           </a:p>
@@ -691,7 +691,7 @@
           <a:p>
             <a:fld id="{409B8A6B-2702-4E09-BF63-7CC1F22DFC4D}" type="slidenum">
               <a:rPr lang="da-DK" smtClean="0"/>
-              <a:t>‹nr.›</a:t>
+              <a:t>‹#›</a:t>
             </a:fld>
             <a:endParaRPr lang="da-DK"/>
           </a:p>
@@ -1143,7 +1143,7 @@
           <a:p>
             <a:fld id="{409B8A6B-2702-4E09-BF63-7CC1F22DFC4D}" type="slidenum">
               <a:rPr lang="da-DK" smtClean="0"/>
-              <a:t>‹nr.›</a:t>
+              <a:t>‹#›</a:t>
             </a:fld>
             <a:endParaRPr lang="da-DK"/>
           </a:p>
@@ -1318,7 +1318,7 @@
           <a:p>
             <a:fld id="{409B8A6B-2702-4E09-BF63-7CC1F22DFC4D}" type="slidenum">
               <a:rPr lang="da-DK" smtClean="0"/>
-              <a:t>‹nr.›</a:t>
+              <a:t>‹#›</a:t>
             </a:fld>
             <a:endParaRPr lang="da-DK"/>
           </a:p>
@@ -1585,7 +1585,7 @@
           <a:p>
             <a:fld id="{409B8A6B-2702-4E09-BF63-7CC1F22DFC4D}" type="slidenum">
               <a:rPr lang="da-DK" smtClean="0"/>
-              <a:t>‹nr.›</a:t>
+              <a:t>‹#›</a:t>
             </a:fld>
             <a:endParaRPr lang="da-DK"/>
           </a:p>
@@ -1801,7 +1801,7 @@
           <a:p>
             <a:fld id="{409B8A6B-2702-4E09-BF63-7CC1F22DFC4D}" type="slidenum">
               <a:rPr lang="da-DK" smtClean="0"/>
-              <a:t>‹nr.›</a:t>
+              <a:t>‹#›</a:t>
             </a:fld>
             <a:endParaRPr lang="da-DK"/>
           </a:p>
@@ -1917,7 +1917,7 @@
           <a:p>
             <a:fld id="{409B8A6B-2702-4E09-BF63-7CC1F22DFC4D}" type="slidenum">
               <a:rPr lang="da-DK" smtClean="0"/>
-              <a:t>‹nr.›</a:t>
+              <a:t>‹#›</a:t>
             </a:fld>
             <a:endParaRPr lang="da-DK"/>
           </a:p>
@@ -2177,7 +2177,7 @@
             <a:fld id="{409B8A6B-2702-4E09-BF63-7CC1F22DFC4D}" type="slidenum">
               <a:rPr lang="da-DK" smtClean="0"/>
               <a:pPr/>
-              <a:t>‹nr.›</a:t>
+              <a:t>‹#›</a:t>
             </a:fld>
             <a:endParaRPr lang="da-DK" dirty="0"/>
           </a:p>
@@ -2515,7 +2515,7 @@
           <a:p>
             <a:fld id="{409B8A6B-2702-4E09-BF63-7CC1F22DFC4D}" type="slidenum">
               <a:rPr lang="da-DK" smtClean="0"/>
-              <a:t>‹nr.›</a:t>
+              <a:t>‹#›</a:t>
             </a:fld>
             <a:endParaRPr lang="da-DK"/>
           </a:p>
@@ -2636,7 +2636,7 @@
           <a:p>
             <a:fld id="{409B8A6B-2702-4E09-BF63-7CC1F22DFC4D}" type="slidenum">
               <a:rPr lang="da-DK" smtClean="0"/>
-              <a:t>‹nr.›</a:t>
+              <a:t>‹#›</a:t>
             </a:fld>
             <a:endParaRPr lang="da-DK"/>
           </a:p>
@@ -3091,7 +3091,7 @@
           <a:p>
             <a:fld id="{409B8A6B-2702-4E09-BF63-7CC1F22DFC4D}" type="slidenum">
               <a:rPr lang="da-DK" smtClean="0"/>
-              <a:t>‹nr.›</a:t>
+              <a:t>‹#›</a:t>
             </a:fld>
             <a:endParaRPr lang="da-DK"/>
           </a:p>
@@ -3468,7 +3468,7 @@
           <a:p>
             <a:fld id="{409B8A6B-2702-4E09-BF63-7CC1F22DFC4D}" type="slidenum">
               <a:rPr lang="da-DK" smtClean="0"/>
-              <a:t>‹nr.›</a:t>
+              <a:t>‹#›</a:t>
             </a:fld>
             <a:endParaRPr lang="da-DK"/>
           </a:p>
@@ -3554,7 +3554,7 @@
           <a:p>
             <a:fld id="{409B8A6B-2702-4E09-BF63-7CC1F22DFC4D}" type="slidenum">
               <a:rPr lang="da-DK" smtClean="0"/>
-              <a:t>‹nr.›</a:t>
+              <a:t>‹#›</a:t>
             </a:fld>
             <a:endParaRPr lang="da-DK"/>
           </a:p>
@@ -3758,7 +3758,7 @@
           <a:p>
             <a:fld id="{409B8A6B-2702-4E09-BF63-7CC1F22DFC4D}" type="slidenum">
               <a:rPr lang="da-DK" smtClean="0"/>
-              <a:t>‹nr.›</a:t>
+              <a:t>‹#›</a:t>
             </a:fld>
             <a:endParaRPr lang="da-DK"/>
           </a:p>
@@ -4109,7 +4109,7 @@
             <a:fld id="{409B8A6B-2702-4E09-BF63-7CC1F22DFC4D}" type="slidenum">
               <a:rPr lang="da-DK" smtClean="0"/>
               <a:pPr/>
-              <a:t>‹nr.›</a:t>
+              <a:t>‹#›</a:t>
             </a:fld>
             <a:endParaRPr lang="da-DK" dirty="0"/>
           </a:p>
@@ -5066,24 +5066,39 @@
         </p:nvSpPr>
         <p:spPr/>
         <p:txBody>
-          <a:bodyPr/>
-          <a:lstStyle/>
-          <a:p>
-            <a:r>
-              <a:rPr lang="en-US" dirty="0" smtClean="0"/>
-              <a:t>(insert structure photo here)</a:t>
-            </a:r>
-          </a:p>
-          <a:p>
-            <a:r>
-              <a:rPr lang="en-US" dirty="0" smtClean="0"/>
-              <a:t>Explain each part of the structure</a:t>
-            </a:r>
-          </a:p>
-          <a:p>
-            <a:r>
-              <a:rPr lang="en-US" dirty="0" smtClean="0"/>
-              <a:t>Receiver is influenced by :</a:t>
+          <a:bodyPr>
+            <a:normAutofit/>
+          </a:bodyPr>
+          <a:lstStyle/>
+          <a:p>
+            <a:r>
+              <a:rPr lang="en-US" dirty="0" smtClean="0"/>
+              <a:t>The basic receiver’s structure.</a:t>
+            </a:r>
+          </a:p>
+          <a:p>
+            <a:endParaRPr lang="en-US" dirty="0"/>
+          </a:p>
+          <a:p>
+            <a:endParaRPr lang="en-US" dirty="0" smtClean="0"/>
+          </a:p>
+          <a:p>
+            <a:endParaRPr lang="en-US" dirty="0"/>
+          </a:p>
+          <a:p>
+            <a:pPr marL="0" indent="0">
+              <a:buNone/>
+            </a:pPr>
+            <a:endParaRPr lang="en-US" dirty="0"/>
+          </a:p>
+          <a:p>
+            <a:r>
+              <a:rPr lang="en-US" dirty="0" smtClean="0"/>
+              <a:t>Receiver </a:t>
+            </a:r>
+            <a:r>
+              <a:rPr lang="en-US" dirty="0" smtClean="0"/>
+              <a:t>is influenced by :</a:t>
             </a:r>
           </a:p>
           <a:p>
@@ -5119,14 +5134,16 @@
           <a:p>
             <a:r>
               <a:rPr lang="en-US" dirty="0" smtClean="0"/>
-              <a:t>Correction with Network Analyzer</a:t>
-            </a:r>
-          </a:p>
-          <a:p>
-            <a:r>
-              <a:rPr lang="en-US" dirty="0" smtClean="0"/>
-              <a:t>Calibration</a:t>
-            </a:r>
+              <a:t>Noise is the dominant factor.</a:t>
+            </a:r>
+            <a:endParaRPr lang="en-US" dirty="0" smtClean="0"/>
+          </a:p>
+          <a:p>
+            <a:r>
+              <a:rPr lang="en-US" dirty="0" smtClean="0"/>
+              <a:t>Calibration for distortion</a:t>
+            </a:r>
+            <a:endParaRPr lang="en-US" dirty="0" smtClean="0"/>
           </a:p>
           <a:p>
             <a:endParaRPr lang="en-US" dirty="0"/>
@@ -5136,6 +5153,36 @@
           </a:p>
         </p:txBody>
       </p:sp>
+      <p:pic>
+        <p:nvPicPr>
+          <p:cNvPr id="4" name="Picture 3"/>
+          <p:cNvPicPr>
+            <a:picLocks noChangeAspect="1"/>
+          </p:cNvPicPr>
+          <p:nvPr/>
+        </p:nvPicPr>
+        <p:blipFill>
+          <a:blip r:embed="rId2">
+            <a:extLst>
+              <a:ext uri="{28A0092B-C50C-407E-A947-70E740481C1C}">
+                <a14:useLocalDpi xmlns:a14="http://schemas.microsoft.com/office/drawing/2010/main" val="0"/>
+              </a:ext>
+            </a:extLst>
+          </a:blip>
+          <a:stretch>
+            <a:fillRect/>
+          </a:stretch>
+        </p:blipFill>
+        <p:spPr>
+          <a:xfrm>
+            <a:off x="755576" y="2060848"/>
+            <a:ext cx="3727798" cy="1184300"/>
+          </a:xfrm>
+          <a:prstGeom prst="rect">
+            <a:avLst/>
+          </a:prstGeom>
+        </p:spPr>
+      </p:pic>
     </p:spTree>
     <p:extLst>
       <p:ext uri="{BB962C8B-B14F-4D97-AF65-F5344CB8AC3E}">
@@ -5214,9 +5261,19 @@
             </a:r>
           </a:p>
           <a:p>
-            <a:r>
-              <a:rPr lang="en-US" dirty="0" smtClean="0"/>
-              <a:t>Sensitivity lowest signal that meets the receiver’s criteria</a:t>
+            <a:endParaRPr lang="en-US" dirty="0" smtClean="0"/>
+          </a:p>
+          <a:p>
+            <a:endParaRPr lang="en-US" dirty="0"/>
+          </a:p>
+          <a:p>
+            <a:r>
+              <a:rPr lang="en-US" dirty="0" smtClean="0"/>
+              <a:t>Sensitivity </a:t>
+            </a:r>
+            <a:r>
+              <a:rPr lang="en-US" dirty="0" smtClean="0"/>
+              <a:t>lowest signal that meets the receiver’s criteria</a:t>
             </a:r>
           </a:p>
           <a:p>
@@ -5240,6 +5297,36 @@
           </a:p>
         </p:txBody>
       </p:sp>
+      <p:pic>
+        <p:nvPicPr>
+          <p:cNvPr id="4" name="Picture 3"/>
+          <p:cNvPicPr>
+            <a:picLocks noChangeAspect="1"/>
+          </p:cNvPicPr>
+          <p:nvPr/>
+        </p:nvPicPr>
+        <p:blipFill>
+          <a:blip r:embed="rId2">
+            <a:extLst>
+              <a:ext uri="{28A0092B-C50C-407E-A947-70E740481C1C}">
+                <a14:useLocalDpi xmlns:a14="http://schemas.microsoft.com/office/drawing/2010/main" val="0"/>
+              </a:ext>
+            </a:extLst>
+          </a:blip>
+          <a:stretch>
+            <a:fillRect/>
+          </a:stretch>
+        </p:blipFill>
+        <p:spPr>
+          <a:xfrm>
+            <a:off x="827584" y="1988840"/>
+            <a:ext cx="2210108" cy="523948"/>
+          </a:xfrm>
+          <a:prstGeom prst="rect">
+            <a:avLst/>
+          </a:prstGeom>
+        </p:spPr>
+      </p:pic>
     </p:spTree>
     <p:extLst>
       <p:ext uri="{BB962C8B-B14F-4D97-AF65-F5344CB8AC3E}">
@@ -5354,9 +5441,31 @@
             </a:r>
           </a:p>
           <a:p>
-            <a:r>
-              <a:rPr lang="en-US" dirty="0" smtClean="0"/>
-              <a:t>For 90% confidence level and </a:t>
+            <a:endParaRPr lang="en-US" dirty="0" smtClean="0"/>
+          </a:p>
+          <a:p>
+            <a:endParaRPr lang="en-US" dirty="0"/>
+          </a:p>
+          <a:p>
+            <a:endParaRPr lang="en-US" dirty="0" smtClean="0"/>
+          </a:p>
+          <a:p>
+            <a:endParaRPr lang="en-US" dirty="0"/>
+          </a:p>
+          <a:p>
+            <a:endParaRPr lang="en-US" dirty="0" smtClean="0"/>
+          </a:p>
+          <a:p>
+            <a:endParaRPr lang="en-US" dirty="0"/>
+          </a:p>
+          <a:p>
+            <a:r>
+              <a:rPr lang="en-US" dirty="0" smtClean="0"/>
+              <a:t>For </a:t>
+            </a:r>
+            <a:r>
+              <a:rPr lang="en-US" dirty="0" smtClean="0"/>
+              <a:t>90% confidence level and </a:t>
             </a:r>
             <a:r>
               <a:rPr lang="el-GR" dirty="0"/>
@@ -5370,6 +5479,36 @@
           </a:p>
         </p:txBody>
       </p:sp>
+      <p:pic>
+        <p:nvPicPr>
+          <p:cNvPr id="4" name="Picture 3"/>
+          <p:cNvPicPr>
+            <a:picLocks noChangeAspect="1"/>
+          </p:cNvPicPr>
+          <p:nvPr/>
+        </p:nvPicPr>
+        <p:blipFill>
+          <a:blip r:embed="rId2">
+            <a:extLst>
+              <a:ext uri="{28A0092B-C50C-407E-A947-70E740481C1C}">
+                <a14:useLocalDpi xmlns:a14="http://schemas.microsoft.com/office/drawing/2010/main" val="0"/>
+              </a:ext>
+            </a:extLst>
+          </a:blip>
+          <a:stretch>
+            <a:fillRect/>
+          </a:stretch>
+        </p:blipFill>
+        <p:spPr>
+          <a:xfrm>
+            <a:off x="755577" y="3212976"/>
+            <a:ext cx="2751801" cy="2016224"/>
+          </a:xfrm>
+          <a:prstGeom prst="rect">
+            <a:avLst/>
+          </a:prstGeom>
+        </p:spPr>
+      </p:pic>
     </p:spTree>
     <p:extLst>
       <p:ext uri="{BB962C8B-B14F-4D97-AF65-F5344CB8AC3E}">
@@ -5442,16 +5581,81 @@
           <a:bodyPr/>
           <a:lstStyle/>
           <a:p>
-            <a:r>
-              <a:rPr lang="en-US" dirty="0" smtClean="0"/>
-              <a:t>(insert picture of designed room)</a:t>
-            </a:r>
-          </a:p>
-          <a:p>
-            <a:endParaRPr lang="el-GR" dirty="0"/>
-          </a:p>
-        </p:txBody>
-      </p:sp>
+            <a:endParaRPr lang="en-US" dirty="0" smtClean="0"/>
+          </a:p>
+          <a:p>
+            <a:endParaRPr lang="en-US" dirty="0"/>
+          </a:p>
+          <a:p>
+            <a:endParaRPr lang="en-US" dirty="0" smtClean="0"/>
+          </a:p>
+          <a:p>
+            <a:endParaRPr lang="en-US" dirty="0"/>
+          </a:p>
+          <a:p>
+            <a:endParaRPr lang="en-US" dirty="0" smtClean="0"/>
+          </a:p>
+          <a:p>
+            <a:endParaRPr lang="en-US" dirty="0"/>
+          </a:p>
+          <a:p>
+            <a:endParaRPr lang="en-US" dirty="0" smtClean="0"/>
+          </a:p>
+          <a:p>
+            <a:endParaRPr lang="en-US" dirty="0"/>
+          </a:p>
+          <a:p>
+            <a:endParaRPr lang="en-US" dirty="0" smtClean="0"/>
+          </a:p>
+          <a:p>
+            <a:r>
+              <a:rPr lang="en-US" dirty="0" smtClean="0"/>
+              <a:t>The measurements were contacted in the blue shaded space</a:t>
+            </a:r>
+            <a:r>
+              <a:rPr lang="en-US" dirty="0"/>
+              <a:t/>
+            </a:r>
+            <a:br>
+              <a:rPr lang="en-US" dirty="0"/>
+            </a:br>
+            <a:r>
+              <a:rPr lang="en-US" dirty="0" smtClean="0"/>
+              <a:t>while The antenna position is circled with red.</a:t>
+            </a:r>
+          </a:p>
+        </p:txBody>
+      </p:sp>
+      <p:pic>
+        <p:nvPicPr>
+          <p:cNvPr id="5" name="Picture 4"/>
+          <p:cNvPicPr>
+            <a:picLocks noChangeAspect="1"/>
+          </p:cNvPicPr>
+          <p:nvPr/>
+        </p:nvPicPr>
+        <p:blipFill>
+          <a:blip r:embed="rId2">
+            <a:extLst>
+              <a:ext uri="{28A0092B-C50C-407E-A947-70E740481C1C}">
+                <a14:useLocalDpi xmlns:a14="http://schemas.microsoft.com/office/drawing/2010/main" val="0"/>
+              </a:ext>
+            </a:extLst>
+          </a:blip>
+          <a:stretch>
+            <a:fillRect/>
+          </a:stretch>
+        </p:blipFill>
+        <p:spPr>
+          <a:xfrm>
+            <a:off x="755576" y="1484784"/>
+            <a:ext cx="3190639" cy="3030514"/>
+          </a:xfrm>
+          <a:prstGeom prst="rect">
+            <a:avLst/>
+          </a:prstGeom>
+        </p:spPr>
+      </p:pic>
     </p:spTree>
     <p:extLst>
       <p:ext uri="{BB962C8B-B14F-4D97-AF65-F5344CB8AC3E}">

</xml_diff>